<commit_message>
Updates to talks on Tuesday
</commit_message>
<xml_diff>
--- a/CSNS_March_2019/2_Tuesday_March_26th/4_monochromators/Monochromator.pptx
+++ b/CSNS_March_2019/2_Tuesday_March_26th/4_monochromators/Monochromator.pptx
@@ -1465,7 +1465,7 @@
           </a:ln>
           <a:extLst>
             <a:ext uri="{C572A759-6A51-4108-AA02-DFA0A04FC94B}">
-              <ma14:wrappingTextBoxFlag xmlns="" xmlns:m="http://schemas.openxmlformats.org/officeDocument/2006/math" xmlns:a14="http://schemas.microsoft.com/office/drawing/2010/main" xmlns:ma14="http://schemas.microsoft.com/office/mac/drawingml/2011/main" val="1"/>
+              <ma14:wrappingTextBoxFlag xmlns:ma14="http://schemas.microsoft.com/office/mac/drawingml/2011/main" xmlns:a14="http://schemas.microsoft.com/office/drawing/2010/main" xmlns:m="http://schemas.openxmlformats.org/officeDocument/2006/math" xmlns="" val="1"/>
             </a:ext>
           </a:extLst>
         </p:spPr>
@@ -1511,7 +1511,7 @@
           </a:ln>
           <a:extLst>
             <a:ext uri="{C572A759-6A51-4108-AA02-DFA0A04FC94B}">
-              <ma14:wrappingTextBoxFlag xmlns="" xmlns:m="http://schemas.openxmlformats.org/officeDocument/2006/math" xmlns:a14="http://schemas.microsoft.com/office/drawing/2010/main" xmlns:ma14="http://schemas.microsoft.com/office/mac/drawingml/2011/main" val="1"/>
+              <ma14:wrappingTextBoxFlag xmlns:ma14="http://schemas.microsoft.com/office/mac/drawingml/2011/main" xmlns:a14="http://schemas.microsoft.com/office/drawing/2010/main" xmlns:m="http://schemas.openxmlformats.org/officeDocument/2006/math" xmlns="" val="1"/>
             </a:ext>
           </a:extLst>
         </p:spPr>
@@ -2499,7 +2499,7 @@
             <a:effectLst/>
             <a:extLst>
               <a:ext uri="{C572A759-6A51-4108-AA02-DFA0A04FC94B}">
-                <ma14:wrappingTextBoxFlag xmlns="" xmlns:m="http://schemas.openxmlformats.org/officeDocument/2006/math" xmlns:a14="http://schemas.microsoft.com/office/drawing/2010/main" xmlns:ma14="http://schemas.microsoft.com/office/mac/drawingml/2011/main" val="1"/>
+                <ma14:wrappingTextBoxFlag xmlns:ma14="http://schemas.microsoft.com/office/mac/drawingml/2011/main" xmlns:a14="http://schemas.microsoft.com/office/drawing/2010/main" xmlns:m="http://schemas.openxmlformats.org/officeDocument/2006/math" xmlns="" val="1"/>
               </a:ext>
             </a:extLst>
           </p:spPr>
@@ -3097,7 +3097,7 @@
           </a:ln>
           <a:extLst>
             <a:ext uri="{C572A759-6A51-4108-AA02-DFA0A04FC94B}">
-              <ma14:wrappingTextBoxFlag xmlns="" xmlns:m="http://schemas.openxmlformats.org/officeDocument/2006/math" xmlns:a14="http://schemas.microsoft.com/office/drawing/2010/main" xmlns:ma14="http://schemas.microsoft.com/office/mac/drawingml/2011/main" val="1"/>
+              <ma14:wrappingTextBoxFlag xmlns:ma14="http://schemas.microsoft.com/office/mac/drawingml/2011/main" xmlns:a14="http://schemas.microsoft.com/office/drawing/2010/main" xmlns:m="http://schemas.openxmlformats.org/officeDocument/2006/math" xmlns="" val="1"/>
             </a:ext>
           </a:extLst>
         </p:spPr>
@@ -3143,7 +3143,7 @@
           </a:ln>
           <a:extLst>
             <a:ext uri="{C572A759-6A51-4108-AA02-DFA0A04FC94B}">
-              <ma14:wrappingTextBoxFlag xmlns="" xmlns:m="http://schemas.openxmlformats.org/officeDocument/2006/math" xmlns:a14="http://schemas.microsoft.com/office/drawing/2010/main" xmlns:ma14="http://schemas.microsoft.com/office/mac/drawingml/2011/main" val="1"/>
+              <ma14:wrappingTextBoxFlag xmlns:ma14="http://schemas.microsoft.com/office/mac/drawingml/2011/main" xmlns:a14="http://schemas.microsoft.com/office/drawing/2010/main" xmlns:m="http://schemas.openxmlformats.org/officeDocument/2006/math" xmlns="" val="1"/>
             </a:ext>
           </a:extLst>
         </p:spPr>
@@ -4047,7 +4047,7 @@
             <a:effectLst/>
             <a:extLst>
               <a:ext uri="{C572A759-6A51-4108-AA02-DFA0A04FC94B}">
-                <ma14:wrappingTextBoxFlag xmlns="" xmlns:m="http://schemas.openxmlformats.org/officeDocument/2006/math" xmlns:a14="http://schemas.microsoft.com/office/drawing/2010/main" xmlns:ma14="http://schemas.microsoft.com/office/mac/drawingml/2011/main" val="1"/>
+                <ma14:wrappingTextBoxFlag xmlns:ma14="http://schemas.microsoft.com/office/mac/drawingml/2011/main" xmlns:a14="http://schemas.microsoft.com/office/drawing/2010/main" xmlns:m="http://schemas.openxmlformats.org/officeDocument/2006/math" xmlns="" val="1"/>
               </a:ext>
             </a:extLst>
           </p:spPr>
@@ -4674,7 +4674,7 @@
           </a:ln>
           <a:extLst>
             <a:ext uri="{C572A759-6A51-4108-AA02-DFA0A04FC94B}">
-              <ma14:wrappingTextBoxFlag xmlns="" xmlns:m="http://schemas.openxmlformats.org/officeDocument/2006/math" xmlns:a14="http://schemas.microsoft.com/office/drawing/2010/main" xmlns:ma14="http://schemas.microsoft.com/office/mac/drawingml/2011/main" val="1"/>
+              <ma14:wrappingTextBoxFlag xmlns:ma14="http://schemas.microsoft.com/office/mac/drawingml/2011/main" xmlns:a14="http://schemas.microsoft.com/office/drawing/2010/main" xmlns:m="http://schemas.openxmlformats.org/officeDocument/2006/math" xmlns="" val="1"/>
             </a:ext>
           </a:extLst>
         </p:spPr>
@@ -4720,7 +4720,7 @@
           </a:ln>
           <a:extLst>
             <a:ext uri="{C572A759-6A51-4108-AA02-DFA0A04FC94B}">
-              <ma14:wrappingTextBoxFlag xmlns="" xmlns:m="http://schemas.openxmlformats.org/officeDocument/2006/math" xmlns:a14="http://schemas.microsoft.com/office/drawing/2010/main" xmlns:ma14="http://schemas.microsoft.com/office/mac/drawingml/2011/main" val="1"/>
+              <ma14:wrappingTextBoxFlag xmlns:ma14="http://schemas.microsoft.com/office/mac/drawingml/2011/main" xmlns:a14="http://schemas.microsoft.com/office/drawing/2010/main" xmlns:m="http://schemas.openxmlformats.org/officeDocument/2006/math" xmlns="" val="1"/>
             </a:ext>
           </a:extLst>
         </p:spPr>
@@ -5653,7 +5653,7 @@
             <a:effectLst/>
             <a:extLst>
               <a:ext uri="{C572A759-6A51-4108-AA02-DFA0A04FC94B}">
-                <ma14:wrappingTextBoxFlag xmlns="" xmlns:m="http://schemas.openxmlformats.org/officeDocument/2006/math" xmlns:a14="http://schemas.microsoft.com/office/drawing/2010/main" xmlns:ma14="http://schemas.microsoft.com/office/mac/drawingml/2011/main" val="1"/>
+                <ma14:wrappingTextBoxFlag xmlns:ma14="http://schemas.microsoft.com/office/mac/drawingml/2011/main" xmlns:a14="http://schemas.microsoft.com/office/drawing/2010/main" xmlns:m="http://schemas.openxmlformats.org/officeDocument/2006/math" xmlns="" val="1"/>
               </a:ext>
             </a:extLst>
           </p:spPr>
@@ -6259,7 +6259,7 @@
           </a:ln>
           <a:extLst>
             <a:ext uri="{C572A759-6A51-4108-AA02-DFA0A04FC94B}">
-              <ma14:wrappingTextBoxFlag xmlns="" xmlns:m="http://schemas.openxmlformats.org/officeDocument/2006/math" xmlns:a14="http://schemas.microsoft.com/office/drawing/2010/main" xmlns:ma14="http://schemas.microsoft.com/office/mac/drawingml/2011/main" val="1"/>
+              <ma14:wrappingTextBoxFlag xmlns:ma14="http://schemas.microsoft.com/office/mac/drawingml/2011/main" xmlns:a14="http://schemas.microsoft.com/office/drawing/2010/main" xmlns:m="http://schemas.openxmlformats.org/officeDocument/2006/math" xmlns="" val="1"/>
             </a:ext>
           </a:extLst>
         </p:spPr>
@@ -6305,7 +6305,7 @@
           </a:ln>
           <a:extLst>
             <a:ext uri="{C572A759-6A51-4108-AA02-DFA0A04FC94B}">
-              <ma14:wrappingTextBoxFlag xmlns="" xmlns:m="http://schemas.openxmlformats.org/officeDocument/2006/math" xmlns:a14="http://schemas.microsoft.com/office/drawing/2010/main" xmlns:ma14="http://schemas.microsoft.com/office/mac/drawingml/2011/main" val="1"/>
+              <ma14:wrappingTextBoxFlag xmlns:ma14="http://schemas.microsoft.com/office/mac/drawingml/2011/main" xmlns:a14="http://schemas.microsoft.com/office/drawing/2010/main" xmlns:m="http://schemas.openxmlformats.org/officeDocument/2006/math" xmlns="" val="1"/>
             </a:ext>
           </a:extLst>
         </p:spPr>
@@ -7172,7 +7172,7 @@
             <a:effectLst/>
             <a:extLst>
               <a:ext uri="{C572A759-6A51-4108-AA02-DFA0A04FC94B}">
-                <ma14:wrappingTextBoxFlag xmlns="" xmlns:m="http://schemas.openxmlformats.org/officeDocument/2006/math" xmlns:a14="http://schemas.microsoft.com/office/drawing/2010/main" xmlns:ma14="http://schemas.microsoft.com/office/mac/drawingml/2011/main" val="1"/>
+                <ma14:wrappingTextBoxFlag xmlns:ma14="http://schemas.microsoft.com/office/mac/drawingml/2011/main" xmlns:a14="http://schemas.microsoft.com/office/drawing/2010/main" xmlns:m="http://schemas.openxmlformats.org/officeDocument/2006/math" xmlns="" val="1"/>
               </a:ext>
             </a:extLst>
           </p:spPr>
@@ -7225,7 +7225,7 @@
           </a:ln>
           <a:extLst>
             <a:ext uri="{C572A759-6A51-4108-AA02-DFA0A04FC94B}">
-              <ma14:wrappingTextBoxFlag xmlns="" xmlns:m="http://schemas.openxmlformats.org/officeDocument/2006/math" xmlns:a14="http://schemas.microsoft.com/office/drawing/2010/main" xmlns:ma14="http://schemas.microsoft.com/office/mac/drawingml/2011/main" val="1"/>
+              <ma14:wrappingTextBoxFlag xmlns:ma14="http://schemas.microsoft.com/office/mac/drawingml/2011/main" xmlns:a14="http://schemas.microsoft.com/office/drawing/2010/main" xmlns:m="http://schemas.openxmlformats.org/officeDocument/2006/math" xmlns="" val="1"/>
             </a:ext>
           </a:extLst>
         </p:spPr>
@@ -7262,7 +7262,7 @@
           </a:ln>
           <a:extLst>
             <a:ext uri="{C572A759-6A51-4108-AA02-DFA0A04FC94B}">
-              <ma14:wrappingTextBoxFlag xmlns="" xmlns:m="http://schemas.openxmlformats.org/officeDocument/2006/math" xmlns:a14="http://schemas.microsoft.com/office/drawing/2010/main" xmlns:ma14="http://schemas.microsoft.com/office/mac/drawingml/2011/main" val="1"/>
+              <ma14:wrappingTextBoxFlag xmlns:ma14="http://schemas.microsoft.com/office/mac/drawingml/2011/main" xmlns:a14="http://schemas.microsoft.com/office/drawing/2010/main" xmlns:m="http://schemas.openxmlformats.org/officeDocument/2006/math" xmlns="" val="1"/>
             </a:ext>
           </a:extLst>
         </p:spPr>
@@ -8202,7 +8202,7 @@
           </a:prstGeom>
           <a:extLst>
             <a:ext uri="{C572A759-6A51-4108-AA02-DFA0A04FC94B}">
-              <ma14:wrappingTextBoxFlag xmlns="" xmlns:m="http://schemas.openxmlformats.org/officeDocument/2006/math" xmlns:a14="http://schemas.microsoft.com/office/drawing/2010/main" xmlns:ma14="http://schemas.microsoft.com/office/mac/drawingml/2011/main" val="1"/>
+              <ma14:wrappingTextBoxFlag xmlns:ma14="http://schemas.microsoft.com/office/mac/drawingml/2011/main" xmlns:a14="http://schemas.microsoft.com/office/drawing/2010/main" xmlns:m="http://schemas.openxmlformats.org/officeDocument/2006/math" xmlns="" val="1"/>
             </a:ext>
           </a:extLst>
         </p:spPr>
@@ -8352,12 +8352,8 @@
           <a:p>
             <a:pPr lvl="2"/>
             <a:r>
-              <a:rPr lang="da-DK" sz="2000" dirty="0" err="1"/>
-              <a:t>Use</a:t>
-            </a:r>
-            <a:r>
               <a:rPr lang="da-DK" sz="2000" dirty="0"/>
-              <a:t> </a:t>
+              <a:t>Set </a:t>
             </a:r>
             <a:r>
               <a:rPr lang="da-DK" sz="2000" dirty="0" err="1"/>
@@ -8618,7 +8614,7 @@
           </a:prstGeom>
           <a:extLst>
             <a:ext uri="{C572A759-6A51-4108-AA02-DFA0A04FC94B}">
-              <ma14:wrappingTextBoxFlag xmlns="" xmlns:m="http://schemas.openxmlformats.org/officeDocument/2006/math" xmlns:a14="http://schemas.microsoft.com/office/drawing/2010/main" xmlns:ma14="http://schemas.microsoft.com/office/mac/drawingml/2011/main" val="1"/>
+              <ma14:wrappingTextBoxFlag xmlns:ma14="http://schemas.microsoft.com/office/mac/drawingml/2011/main" xmlns:a14="http://schemas.microsoft.com/office/drawing/2010/main" xmlns:m="http://schemas.openxmlformats.org/officeDocument/2006/math" xmlns="" val="1"/>
             </a:ext>
           </a:extLst>
         </p:spPr>
@@ -8666,6 +8662,128 @@
               <a:defRPr sz="1800"/>
             </a:pPr>
             <a:endParaRPr/>
+          </a:p>
+        </p:txBody>
+      </p:sp>
+      <p:sp>
+        <p:nvSpPr>
+          <p:cNvPr id="2" name="TextBox 1">
+            <a:extLst>
+              <a:ext uri="{FF2B5EF4-FFF2-40B4-BE49-F238E27FC236}">
+                <a16:creationId xmlns:a16="http://schemas.microsoft.com/office/drawing/2014/main" id="{D2E37E6D-5DFE-8C46-894D-0F2197B7B261}"/>
+              </a:ext>
+            </a:extLst>
+          </p:cNvPr>
+          <p:cNvSpPr txBox="1"/>
+          <p:nvPr/>
+        </p:nvSpPr>
+        <p:spPr>
+          <a:xfrm rot="390092">
+            <a:off x="7084355" y="372978"/>
+            <a:ext cx="4850687" cy="907941"/>
+          </a:xfrm>
+          <a:prstGeom prst="rect">
+            <a:avLst/>
+          </a:prstGeom>
+          <a:noFill/>
+          <a:ln w="12700" cap="flat">
+            <a:noFill/>
+            <a:miter lim="400000"/>
+          </a:ln>
+          <a:effectLst/>
+          <a:sp3d/>
+        </p:spPr>
+        <p:style>
+          <a:lnRef idx="0">
+            <a:scrgbClr r="0" g="0" b="0"/>
+          </a:lnRef>
+          <a:fillRef idx="0">
+            <a:scrgbClr r="0" g="0" b="0"/>
+          </a:fillRef>
+          <a:effectRef idx="0">
+            <a:scrgbClr r="0" g="0" b="0"/>
+          </a:effectRef>
+          <a:fontRef idx="none"/>
+        </p:style>
+        <p:txBody>
+          <a:bodyPr rot="0" spcFirstLastPara="1" vertOverflow="overflow" horzOverflow="overflow" vert="horz" wrap="none" lIns="0" tIns="0" rIns="0" bIns="0" numCol="1" spcCol="38100" rtlCol="0" anchor="t">
+            <a:spAutoFit/>
+          </a:bodyPr>
+          <a:lstStyle/>
+          <a:p>
+            <a:r>
+              <a:rPr lang="da-DK" sz="2200" dirty="0"/>
+              <a:t>Solution on </a:t>
+            </a:r>
+            <a:r>
+              <a:rPr lang="da-DK" sz="2200" dirty="0" err="1"/>
+              <a:t>github</a:t>
+            </a:r>
+            <a:r>
+              <a:rPr lang="da-DK" sz="2200" dirty="0"/>
+              <a:t>, </a:t>
+            </a:r>
+            <a:r>
+              <a:rPr lang="da-DK" sz="2200" dirty="0" err="1"/>
+              <a:t>use</a:t>
+            </a:r>
+            <a:r>
+              <a:rPr lang="da-DK" sz="2200" dirty="0"/>
+              <a:t> if </a:t>
+            </a:r>
+            <a:r>
+              <a:rPr lang="da-DK" sz="2200" dirty="0" err="1"/>
+              <a:t>you</a:t>
+            </a:r>
+            <a:r>
+              <a:rPr lang="da-DK" sz="2200" dirty="0"/>
+              <a:t> </a:t>
+            </a:r>
+            <a:r>
+              <a:rPr lang="da-DK" sz="2200" dirty="0" err="1"/>
+              <a:t>are</a:t>
+            </a:r>
+            <a:r>
+              <a:rPr lang="da-DK" sz="2200" dirty="0"/>
+              <a:t> </a:t>
+            </a:r>
+            <a:r>
+              <a:rPr lang="da-DK" sz="2200" dirty="0" err="1"/>
+              <a:t>stuck</a:t>
+            </a:r>
+            <a:endParaRPr lang="da-DK" sz="2200" dirty="0"/>
+          </a:p>
+          <a:p>
+            <a:pPr marL="0" marR="0" indent="0" algn="l" defTabSz="914400" rtl="0" fontAlgn="auto" latinLnBrk="0" hangingPunct="0">
+              <a:lnSpc>
+                <a:spcPct val="100000"/>
+              </a:lnSpc>
+              <a:spcBef>
+                <a:spcPts val="900"/>
+              </a:spcBef>
+              <a:spcAft>
+                <a:spcPts val="0"/>
+              </a:spcAft>
+              <a:buClrTx/>
+              <a:buSzTx/>
+              <a:buFontTx/>
+              <a:buNone/>
+              <a:tabLst/>
+            </a:pPr>
+            <a:endParaRPr kumimoji="0" lang="da-DK" sz="2200" b="0" i="0" u="none" strike="noStrike" cap="none" spc="0" normalizeH="0" baseline="0" dirty="0">
+              <a:ln>
+                <a:noFill/>
+              </a:ln>
+              <a:solidFill>
+                <a:srgbClr val="000000"/>
+              </a:solidFill>
+              <a:effectLst/>
+              <a:uFillTx/>
+              <a:latin typeface="+mn-lt"/>
+              <a:ea typeface="+mn-ea"/>
+              <a:cs typeface="+mn-cs"/>
+              <a:sym typeface="Arial"/>
+            </a:endParaRPr>
           </a:p>
         </p:txBody>
       </p:sp>
@@ -8861,7 +8979,7 @@
           </a:prstGeom>
           <a:extLst>
             <a:ext uri="{C572A759-6A51-4108-AA02-DFA0A04FC94B}">
-              <ma14:wrappingTextBoxFlag xmlns="" xmlns:m="http://schemas.openxmlformats.org/officeDocument/2006/math" xmlns:a14="http://schemas.microsoft.com/office/drawing/2010/main" xmlns:ma14="http://schemas.microsoft.com/office/mac/drawingml/2011/main" val="1"/>
+              <ma14:wrappingTextBoxFlag xmlns:ma14="http://schemas.microsoft.com/office/mac/drawingml/2011/main" xmlns:a14="http://schemas.microsoft.com/office/drawing/2010/main" xmlns:m="http://schemas.openxmlformats.org/officeDocument/2006/math" xmlns="" val="1"/>
             </a:ext>
           </a:extLst>
         </p:spPr>
@@ -9110,7 +9228,7 @@
           </a:prstGeom>
           <a:extLst>
             <a:ext uri="{C572A759-6A51-4108-AA02-DFA0A04FC94B}">
-              <ma14:wrappingTextBoxFlag xmlns="" xmlns:m="http://schemas.openxmlformats.org/officeDocument/2006/math" xmlns:a14="http://schemas.microsoft.com/office/drawing/2010/main" xmlns:ma14="http://schemas.microsoft.com/office/mac/drawingml/2011/main" val="1"/>
+              <ma14:wrappingTextBoxFlag xmlns:ma14="http://schemas.microsoft.com/office/mac/drawingml/2011/main" xmlns:a14="http://schemas.microsoft.com/office/drawing/2010/main" xmlns:m="http://schemas.openxmlformats.org/officeDocument/2006/math" xmlns="" val="1"/>
             </a:ext>
           </a:extLst>
         </p:spPr>
@@ -9147,8 +9265,8 @@
         </p:blipFill>
         <p:spPr>
           <a:xfrm>
-            <a:off x="6430913" y="3688280"/>
-            <a:ext cx="5403873" cy="2563698"/>
+            <a:off x="4955459" y="2988297"/>
+            <a:ext cx="6879327" cy="3263681"/>
           </a:xfrm>
           <a:prstGeom prst="rect">
             <a:avLst/>
@@ -9505,7 +9623,7 @@
           </a:prstGeom>
           <a:extLst>
             <a:ext uri="{C572A759-6A51-4108-AA02-DFA0A04FC94B}">
-              <ma14:wrappingTextBoxFlag xmlns="" xmlns:m="http://schemas.openxmlformats.org/officeDocument/2006/math" xmlns:a14="http://schemas.microsoft.com/office/drawing/2010/main" xmlns:ma14="http://schemas.microsoft.com/office/mac/drawingml/2011/main" val="1"/>
+              <ma14:wrappingTextBoxFlag xmlns:ma14="http://schemas.microsoft.com/office/mac/drawingml/2011/main" xmlns:a14="http://schemas.microsoft.com/office/drawing/2010/main" xmlns:m="http://schemas.openxmlformats.org/officeDocument/2006/math" xmlns="" val="1"/>
             </a:ext>
           </a:extLst>
         </p:spPr>
@@ -9966,7 +10084,7 @@
           </a:prstGeom>
           <a:extLst>
             <a:ext uri="{C572A759-6A51-4108-AA02-DFA0A04FC94B}">
-              <ma14:wrappingTextBoxFlag xmlns="" xmlns:m="http://schemas.openxmlformats.org/officeDocument/2006/math" xmlns:a14="http://schemas.microsoft.com/office/drawing/2010/main" xmlns:ma14="http://schemas.microsoft.com/office/mac/drawingml/2011/main" val="1"/>
+              <ma14:wrappingTextBoxFlag xmlns:ma14="http://schemas.microsoft.com/office/mac/drawingml/2011/main" xmlns:a14="http://schemas.microsoft.com/office/drawing/2010/main" xmlns:m="http://schemas.openxmlformats.org/officeDocument/2006/math" xmlns="" val="1"/>
             </a:ext>
           </a:extLst>
         </p:spPr>
@@ -12139,7 +12257,7 @@
           </a:prstGeom>
           <a:extLst>
             <a:ext uri="{C572A759-6A51-4108-AA02-DFA0A04FC94B}">
-              <ma14:wrappingTextBoxFlag xmlns="" xmlns:m="http://schemas.openxmlformats.org/officeDocument/2006/math" xmlns:a14="http://schemas.microsoft.com/office/drawing/2010/main" xmlns:ma14="http://schemas.microsoft.com/office/mac/drawingml/2011/main" val="1"/>
+              <ma14:wrappingTextBoxFlag xmlns:ma14="http://schemas.microsoft.com/office/mac/drawingml/2011/main" xmlns:a14="http://schemas.microsoft.com/office/drawing/2010/main" xmlns:m="http://schemas.openxmlformats.org/officeDocument/2006/math" xmlns="" val="1"/>
             </a:ext>
           </a:extLst>
         </p:spPr>
@@ -13067,7 +13185,7 @@
           </a:prstGeom>
           <a:extLst>
             <a:ext uri="{C572A759-6A51-4108-AA02-DFA0A04FC94B}">
-              <ma14:wrappingTextBoxFlag xmlns="" xmlns:m="http://schemas.openxmlformats.org/officeDocument/2006/math" xmlns:a14="http://schemas.microsoft.com/office/drawing/2010/main" xmlns:ma14="http://schemas.microsoft.com/office/mac/drawingml/2011/main" val="1"/>
+              <ma14:wrappingTextBoxFlag xmlns:ma14="http://schemas.microsoft.com/office/mac/drawingml/2011/main" xmlns:a14="http://schemas.microsoft.com/office/drawing/2010/main" xmlns:m="http://schemas.openxmlformats.org/officeDocument/2006/math" xmlns="" val="1"/>
             </a:ext>
           </a:extLst>
         </p:spPr>
@@ -15581,6 +15699,183 @@
           </a:p>
         </p:txBody>
       </p:sp>
+      <p:sp>
+        <p:nvSpPr>
+          <p:cNvPr id="19" name="Left Brace 18">
+            <a:extLst>
+              <a:ext uri="{FF2B5EF4-FFF2-40B4-BE49-F238E27FC236}">
+                <a16:creationId xmlns:a16="http://schemas.microsoft.com/office/drawing/2014/main" id="{51770FB1-88B1-6946-A0F2-33B51344489E}"/>
+              </a:ext>
+            </a:extLst>
+          </p:cNvPr>
+          <p:cNvSpPr/>
+          <p:nvPr/>
+        </p:nvSpPr>
+        <p:spPr>
+          <a:xfrm>
+            <a:off x="9867505" y="1628442"/>
+            <a:ext cx="268452" cy="110515"/>
+          </a:xfrm>
+          <a:prstGeom prst="leftBrace">
+            <a:avLst/>
+          </a:prstGeom>
+          <a:noFill/>
+          <a:ln w="25400" cap="flat">
+            <a:solidFill>
+              <a:schemeClr val="bg2">
+                <a:lumMod val="60000"/>
+                <a:lumOff val="40000"/>
+              </a:schemeClr>
+            </a:solidFill>
+            <a:prstDash val="solid"/>
+            <a:round/>
+          </a:ln>
+          <a:effectLst/>
+          <a:sp3d/>
+        </p:spPr>
+        <p:style>
+          <a:lnRef idx="0">
+            <a:scrgbClr r="0" g="0" b="0"/>
+          </a:lnRef>
+          <a:fillRef idx="0">
+            <a:scrgbClr r="0" g="0" b="0"/>
+          </a:fillRef>
+          <a:effectRef idx="0">
+            <a:scrgbClr r="0" g="0" b="0"/>
+          </a:effectRef>
+          <a:fontRef idx="none"/>
+        </p:style>
+        <p:txBody>
+          <a:bodyPr rot="0" spcFirstLastPara="1" vertOverflow="overflow" horzOverflow="overflow" vert="horz" wrap="square" lIns="91439" tIns="45719" rIns="91439" bIns="45719" numCol="1" spcCol="38100" rtlCol="0" anchor="t">
+            <a:noAutofit/>
+          </a:bodyPr>
+          <a:lstStyle/>
+          <a:p>
+            <a:pPr marL="0" marR="0" indent="0" algn="l" defTabSz="914400" rtl="0" fontAlgn="auto" latinLnBrk="1" hangingPunct="0">
+              <a:lnSpc>
+                <a:spcPct val="100000"/>
+              </a:lnSpc>
+              <a:spcBef>
+                <a:spcPts val="0"/>
+              </a:spcBef>
+              <a:spcAft>
+                <a:spcPts val="0"/>
+              </a:spcAft>
+              <a:buClrTx/>
+              <a:buSzTx/>
+              <a:buFontTx/>
+              <a:buNone/>
+              <a:tabLst/>
+            </a:pPr>
+            <a:endParaRPr kumimoji="0" lang="da-DK" sz="1800" b="0" i="0" u="none" strike="noStrike" cap="none" spc="0" normalizeH="0" baseline="0">
+              <a:ln>
+                <a:noFill/>
+              </a:ln>
+              <a:solidFill>
+                <a:srgbClr val="000000"/>
+              </a:solidFill>
+              <a:effectLst/>
+              <a:uFillTx/>
+            </a:endParaRPr>
+          </a:p>
+        </p:txBody>
+      </p:sp>
+      <p:sp>
+        <p:nvSpPr>
+          <p:cNvPr id="20" name="TextBox 19">
+            <a:extLst>
+              <a:ext uri="{FF2B5EF4-FFF2-40B4-BE49-F238E27FC236}">
+                <a16:creationId xmlns:a16="http://schemas.microsoft.com/office/drawing/2014/main" id="{23A0BA2D-F643-CD43-A775-56FFFB4177A0}"/>
+              </a:ext>
+            </a:extLst>
+          </p:cNvPr>
+          <p:cNvSpPr txBox="1"/>
+          <p:nvPr/>
+        </p:nvSpPr>
+        <p:spPr>
+          <a:xfrm>
+            <a:off x="9474635" y="1424343"/>
+            <a:ext cx="1116355" cy="361637"/>
+          </a:xfrm>
+          <a:prstGeom prst="rect">
+            <a:avLst/>
+          </a:prstGeom>
+          <a:noFill/>
+          <a:ln w="12700" cap="flat">
+            <a:noFill/>
+            <a:miter lim="400000"/>
+          </a:ln>
+          <a:effectLst/>
+          <a:sp3d/>
+        </p:spPr>
+        <p:style>
+          <a:lnRef idx="0">
+            <a:scrgbClr r="0" g="0" b="0"/>
+          </a:lnRef>
+          <a:fillRef idx="0">
+            <a:scrgbClr r="0" g="0" b="0"/>
+          </a:fillRef>
+          <a:effectRef idx="0">
+            <a:scrgbClr r="0" g="0" b="0"/>
+          </a:effectRef>
+          <a:fontRef idx="none"/>
+        </p:style>
+        <p:txBody>
+          <a:bodyPr rot="0" spcFirstLastPara="1" vertOverflow="overflow" horzOverflow="overflow" vert="horz" wrap="square" lIns="0" tIns="0" rIns="0" bIns="0" numCol="1" spcCol="38100" rtlCol="0" anchor="t">
+            <a:spAutoFit/>
+          </a:bodyPr>
+          <a:lstStyle/>
+          <a:p>
+            <a:pPr marL="0" marR="0" indent="0" algn="l" defTabSz="914400" rtl="0" fontAlgn="auto" latinLnBrk="0" hangingPunct="0">
+              <a:lnSpc>
+                <a:spcPct val="100000"/>
+              </a:lnSpc>
+              <a:spcBef>
+                <a:spcPts val="900"/>
+              </a:spcBef>
+              <a:spcAft>
+                <a:spcPts val="0"/>
+              </a:spcAft>
+              <a:buClrTx/>
+              <a:buSzTx/>
+              <a:buFontTx/>
+              <a:buNone/>
+              <a:tabLst/>
+            </a:pPr>
+            <a:r>
+              <a:rPr kumimoji="0" lang="da-DK" sz="1600" b="0" i="0" u="none" strike="noStrike" cap="none" spc="0" normalizeH="0" baseline="0" dirty="0" err="1">
+                <a:ln>
+                  <a:noFill/>
+                </a:ln>
+                <a:solidFill>
+                  <a:srgbClr val="000000"/>
+                </a:solidFill>
+                <a:effectLst/>
+                <a:uFillTx/>
+                <a:latin typeface="+mn-lt"/>
+                <a:ea typeface="+mn-ea"/>
+                <a:cs typeface="+mn-cs"/>
+                <a:sym typeface="Arial"/>
+              </a:rPr>
+              <a:t>gap</a:t>
+            </a:r>
+            <a:endParaRPr kumimoji="0" lang="da-DK" sz="1600" b="0" i="0" u="none" strike="noStrike" cap="none" spc="0" normalizeH="0" baseline="0" dirty="0">
+              <a:ln>
+                <a:noFill/>
+              </a:ln>
+              <a:solidFill>
+                <a:srgbClr val="000000"/>
+              </a:solidFill>
+              <a:effectLst/>
+              <a:uFillTx/>
+              <a:latin typeface="+mn-lt"/>
+              <a:ea typeface="+mn-ea"/>
+              <a:cs typeface="+mn-cs"/>
+              <a:sym typeface="Arial"/>
+            </a:endParaRPr>
+          </a:p>
+        </p:txBody>
+      </p:sp>
     </p:spTree>
     <p:extLst>
       <p:ext uri="{BB962C8B-B14F-4D97-AF65-F5344CB8AC3E}">
@@ -15749,7 +16044,7 @@
           </a:prstGeom>
           <a:extLst>
             <a:ext uri="{C572A759-6A51-4108-AA02-DFA0A04FC94B}">
-              <ma14:wrappingTextBoxFlag xmlns="" xmlns:m="http://schemas.openxmlformats.org/officeDocument/2006/math" xmlns:a14="http://schemas.microsoft.com/office/drawing/2010/main" xmlns:ma14="http://schemas.microsoft.com/office/mac/drawingml/2011/main" val="1"/>
+              <ma14:wrappingTextBoxFlag xmlns:ma14="http://schemas.microsoft.com/office/mac/drawingml/2011/main" xmlns:a14="http://schemas.microsoft.com/office/drawing/2010/main" xmlns:m="http://schemas.openxmlformats.org/officeDocument/2006/math" xmlns="" val="1"/>
             </a:ext>
           </a:extLst>
         </p:spPr>
@@ -16598,7 +16893,7 @@
           </a:prstGeom>
           <a:extLst>
             <a:ext uri="{C572A759-6A51-4108-AA02-DFA0A04FC94B}">
-              <ma14:wrappingTextBoxFlag xmlns="" xmlns:m="http://schemas.openxmlformats.org/officeDocument/2006/math" xmlns:a14="http://schemas.microsoft.com/office/drawing/2010/main" xmlns:ma14="http://schemas.microsoft.com/office/mac/drawingml/2011/main" val="1"/>
+              <ma14:wrappingTextBoxFlag xmlns:ma14="http://schemas.microsoft.com/office/mac/drawingml/2011/main" xmlns:a14="http://schemas.microsoft.com/office/drawing/2010/main" xmlns:m="http://schemas.openxmlformats.org/officeDocument/2006/math" xmlns="" val="1"/>
             </a:ext>
           </a:extLst>
         </p:spPr>

</xml_diff>